<commit_message>
Added notes for my parts
Notes have been added for the database comparison, LINQ, and Azure.
</commit_message>
<xml_diff>
--- a/related work presentation.pptx
+++ b/related work presentation.pptx
@@ -120,7 +120,7 @@
   </p:defaultTextStyle>
   <p:extLst>
     <p:ext uri="{EFAFB233-063F-42B5-8137-9DF3F51BA10A}">
-      <p15:sldGuideLst xmlns:p15="http://schemas.microsoft.com/office/powerpoint/2012/main">
+      <p15:sldGuideLst xmlns:p15="http://schemas.microsoft.com/office/powerpoint/2012/main" xmlns="">
         <p15:guide id="1" orient="horz" pos="2160">
           <p15:clr>
             <a:srgbClr val="A4A3A4"/>
@@ -817,6 +817,345 @@
 </p:notes>
 </file>
 
+<file path=ppt/notesSlides/notesSlide4.xml><?xml version="1.0" encoding="utf-8"?>
+<p:notes xmlns:a="http://schemas.openxmlformats.org/drawingml/2006/main" xmlns:r="http://schemas.openxmlformats.org/officeDocument/2006/relationships" xmlns:p="http://schemas.openxmlformats.org/presentationml/2006/main">
+  <p:cSld>
+    <p:spTree>
+      <p:nvGrpSpPr>
+        <p:cNvPr id="1" name=""/>
+        <p:cNvGrpSpPr/>
+        <p:nvPr/>
+      </p:nvGrpSpPr>
+      <p:grpSpPr>
+        <a:xfrm>
+          <a:off x="0" y="0"/>
+          <a:ext cx="0" cy="0"/>
+          <a:chOff x="0" y="0"/>
+          <a:chExt cx="0" cy="0"/>
+        </a:xfrm>
+      </p:grpSpPr>
+      <p:sp>
+        <p:nvSpPr>
+          <p:cNvPr id="2" name="Slide Image Placeholder 1"/>
+          <p:cNvSpPr>
+            <a:spLocks noGrp="1" noRot="1" noChangeAspect="1"/>
+          </p:cNvSpPr>
+          <p:nvPr>
+            <p:ph type="sldImg"/>
+          </p:nvPr>
+        </p:nvSpPr>
+        <p:spPr/>
+      </p:sp>
+      <p:sp>
+        <p:nvSpPr>
+          <p:cNvPr id="3" name="Notes Placeholder 2"/>
+          <p:cNvSpPr>
+            <a:spLocks noGrp="1"/>
+          </p:cNvSpPr>
+          <p:nvPr>
+            <p:ph type="body" idx="1"/>
+          </p:nvPr>
+        </p:nvSpPr>
+        <p:spPr/>
+        <p:txBody>
+          <a:bodyPr/>
+          <a:lstStyle/>
+          <a:p>
+            <a:r>
+              <a:rPr lang="en-US" dirty="0" smtClean="0"/>
+              <a:t>MySQL</a:t>
+            </a:r>
+            <a:r>
+              <a:rPr lang="en-US" baseline="0" dirty="0" smtClean="0"/>
+              <a:t> is slower than the others, but is potentially faster than SQLite in larger databases or sites/apps with higher traffic.</a:t>
+            </a:r>
+          </a:p>
+          <a:p>
+            <a:endParaRPr lang="en-US" baseline="0" dirty="0" smtClean="0"/>
+          </a:p>
+          <a:p>
+            <a:r>
+              <a:rPr lang="en-US" baseline="0" dirty="0" smtClean="0"/>
+              <a:t>SQL Server is our preferred option. Extremely easy to integrate, and I have experience in it. Reporting is important to give a visualization of the data to the user, and can be printed to give physical reports.</a:t>
+            </a:r>
+          </a:p>
+          <a:p>
+            <a:endParaRPr lang="en-US" baseline="0" dirty="0" smtClean="0"/>
+          </a:p>
+          <a:p>
+            <a:r>
+              <a:rPr lang="en-US" baseline="0" dirty="0" smtClean="0"/>
+              <a:t>SQLite can become very slow as the database grows. Has features where changes can be made offline and then synced to the server when the connection is reestablished. It is not client server, it is embedded.</a:t>
+            </a:r>
+          </a:p>
+          <a:p>
+            <a:endParaRPr lang="en-US" baseline="0" dirty="0" smtClean="0"/>
+          </a:p>
+          <a:p>
+            <a:r>
+              <a:rPr lang="en-US" baseline="0" dirty="0" smtClean="0"/>
+              <a:t>All of these are free to use so it comes down to what we feel is the best fit, which we decided is SQL Server. Its integration into Visual Studio is very important to us, and prior experience makes it a very easy choice.</a:t>
+            </a:r>
+            <a:endParaRPr lang="en-US" dirty="0"/>
+          </a:p>
+        </p:txBody>
+      </p:sp>
+      <p:sp>
+        <p:nvSpPr>
+          <p:cNvPr id="4" name="Slide Number Placeholder 3"/>
+          <p:cNvSpPr>
+            <a:spLocks noGrp="1"/>
+          </p:cNvSpPr>
+          <p:nvPr>
+            <p:ph type="sldNum" sz="quarter" idx="10"/>
+          </p:nvPr>
+        </p:nvSpPr>
+        <p:spPr/>
+        <p:txBody>
+          <a:bodyPr/>
+          <a:lstStyle/>
+          <a:p>
+            <a:fld id="{DC99A9F5-0CA7-4C48-B068-D3E0CFA2D3C2}" type="slidenum">
+              <a:rPr lang="en-US" smtClean="0"/>
+              <a:t>7</a:t>
+            </a:fld>
+            <a:endParaRPr lang="en-US"/>
+          </a:p>
+        </p:txBody>
+      </p:sp>
+    </p:spTree>
+    <p:extLst>
+      <p:ext uri="{BB962C8B-B14F-4D97-AF65-F5344CB8AC3E}">
+        <p14:creationId xmlns:p14="http://schemas.microsoft.com/office/powerpoint/2010/main" val="332804135"/>
+      </p:ext>
+    </p:extLst>
+  </p:cSld>
+  <p:clrMapOvr>
+    <a:masterClrMapping/>
+  </p:clrMapOvr>
+</p:notes>
+</file>
+
+<file path=ppt/notesSlides/notesSlide5.xml><?xml version="1.0" encoding="utf-8"?>
+<p:notes xmlns:a="http://schemas.openxmlformats.org/drawingml/2006/main" xmlns:r="http://schemas.openxmlformats.org/officeDocument/2006/relationships" xmlns:p="http://schemas.openxmlformats.org/presentationml/2006/main">
+  <p:cSld>
+    <p:spTree>
+      <p:nvGrpSpPr>
+        <p:cNvPr id="1" name=""/>
+        <p:cNvGrpSpPr/>
+        <p:nvPr/>
+      </p:nvGrpSpPr>
+      <p:grpSpPr>
+        <a:xfrm>
+          <a:off x="0" y="0"/>
+          <a:ext cx="0" cy="0"/>
+          <a:chOff x="0" y="0"/>
+          <a:chExt cx="0" cy="0"/>
+        </a:xfrm>
+      </p:grpSpPr>
+      <p:sp>
+        <p:nvSpPr>
+          <p:cNvPr id="2" name="Slide Image Placeholder 1"/>
+          <p:cNvSpPr>
+            <a:spLocks noGrp="1" noRot="1" noChangeAspect="1"/>
+          </p:cNvSpPr>
+          <p:nvPr>
+            <p:ph type="sldImg"/>
+          </p:nvPr>
+        </p:nvSpPr>
+        <p:spPr/>
+      </p:sp>
+      <p:sp>
+        <p:nvSpPr>
+          <p:cNvPr id="3" name="Notes Placeholder 2"/>
+          <p:cNvSpPr>
+            <a:spLocks noGrp="1"/>
+          </p:cNvSpPr>
+          <p:nvPr>
+            <p:ph type="body" idx="1"/>
+          </p:nvPr>
+        </p:nvSpPr>
+        <p:spPr/>
+        <p:txBody>
+          <a:bodyPr/>
+          <a:lstStyle/>
+          <a:p>
+            <a:r>
+              <a:rPr lang="en-US" dirty="0" smtClean="0"/>
+              <a:t>Heavily integrated into Visual Studio</a:t>
+            </a:r>
+            <a:r>
+              <a:rPr lang="en-US" baseline="0" dirty="0" smtClean="0"/>
+              <a:t>, so it would be very easy to use in our app.</a:t>
+            </a:r>
+            <a:endParaRPr lang="en-US" dirty="0" smtClean="0"/>
+          </a:p>
+          <a:p>
+            <a:endParaRPr lang="en-US" dirty="0" smtClean="0"/>
+          </a:p>
+          <a:p>
+            <a:r>
+              <a:rPr lang="en-US" dirty="0" smtClean="0"/>
+              <a:t>This could be a good choice for us, but we alread</a:t>
+            </a:r>
+            <a:r>
+              <a:rPr lang="en-US" baseline="0" dirty="0" smtClean="0"/>
+              <a:t>y have servers on the UND campus, which may eliminate the need for this service.</a:t>
+            </a:r>
+          </a:p>
+          <a:p>
+            <a:endParaRPr lang="en-US" baseline="0" dirty="0" smtClean="0"/>
+          </a:p>
+          <a:p>
+            <a:r>
+              <a:rPr lang="en-US" baseline="0" dirty="0" smtClean="0"/>
+              <a:t>A SQL database hosted through Azure costs $4.99 per month, which can be avoided by hosting it locally on campus, and we are getting in contact with someone to talk about hosting a server.</a:t>
+            </a:r>
+          </a:p>
+        </p:txBody>
+      </p:sp>
+      <p:sp>
+        <p:nvSpPr>
+          <p:cNvPr id="4" name="Slide Number Placeholder 3"/>
+          <p:cNvSpPr>
+            <a:spLocks noGrp="1"/>
+          </p:cNvSpPr>
+          <p:nvPr>
+            <p:ph type="sldNum" sz="quarter" idx="10"/>
+          </p:nvPr>
+        </p:nvSpPr>
+        <p:spPr/>
+        <p:txBody>
+          <a:bodyPr/>
+          <a:lstStyle/>
+          <a:p>
+            <a:fld id="{DC99A9F5-0CA7-4C48-B068-D3E0CFA2D3C2}" type="slidenum">
+              <a:rPr lang="en-US" smtClean="0"/>
+              <a:t>8</a:t>
+            </a:fld>
+            <a:endParaRPr lang="en-US"/>
+          </a:p>
+        </p:txBody>
+      </p:sp>
+    </p:spTree>
+    <p:extLst>
+      <p:ext uri="{BB962C8B-B14F-4D97-AF65-F5344CB8AC3E}">
+        <p14:creationId xmlns:p14="http://schemas.microsoft.com/office/powerpoint/2010/main" val="2531396063"/>
+      </p:ext>
+    </p:extLst>
+  </p:cSld>
+  <p:clrMapOvr>
+    <a:masterClrMapping/>
+  </p:clrMapOvr>
+</p:notes>
+</file>
+
+<file path=ppt/notesSlides/notesSlide6.xml><?xml version="1.0" encoding="utf-8"?>
+<p:notes xmlns:a="http://schemas.openxmlformats.org/drawingml/2006/main" xmlns:r="http://schemas.openxmlformats.org/officeDocument/2006/relationships" xmlns:p="http://schemas.openxmlformats.org/presentationml/2006/main">
+  <p:cSld>
+    <p:spTree>
+      <p:nvGrpSpPr>
+        <p:cNvPr id="1" name=""/>
+        <p:cNvGrpSpPr/>
+        <p:nvPr/>
+      </p:nvGrpSpPr>
+      <p:grpSpPr>
+        <a:xfrm>
+          <a:off x="0" y="0"/>
+          <a:ext cx="0" cy="0"/>
+          <a:chOff x="0" y="0"/>
+          <a:chExt cx="0" cy="0"/>
+        </a:xfrm>
+      </p:grpSpPr>
+      <p:sp>
+        <p:nvSpPr>
+          <p:cNvPr id="2" name="Slide Image Placeholder 1"/>
+          <p:cNvSpPr>
+            <a:spLocks noGrp="1" noRot="1" noChangeAspect="1"/>
+          </p:cNvSpPr>
+          <p:nvPr>
+            <p:ph type="sldImg"/>
+          </p:nvPr>
+        </p:nvSpPr>
+        <p:spPr/>
+      </p:sp>
+      <p:sp>
+        <p:nvSpPr>
+          <p:cNvPr id="3" name="Notes Placeholder 2"/>
+          <p:cNvSpPr>
+            <a:spLocks noGrp="1"/>
+          </p:cNvSpPr>
+          <p:nvPr>
+            <p:ph type="body" idx="1"/>
+          </p:nvPr>
+        </p:nvSpPr>
+        <p:spPr/>
+        <p:txBody>
+          <a:bodyPr/>
+          <a:lstStyle/>
+          <a:p>
+            <a:r>
+              <a:rPr lang="en-US" dirty="0" smtClean="0"/>
+              <a:t>This would let use a</a:t>
+            </a:r>
+            <a:r>
+              <a:rPr lang="en-US" baseline="0" dirty="0" smtClean="0"/>
+              <a:t> language like C# to write our database queries. Would make things very easy for us for database transactions</a:t>
+            </a:r>
+          </a:p>
+          <a:p>
+            <a:endParaRPr lang="en-US" baseline="0" dirty="0" smtClean="0"/>
+          </a:p>
+          <a:p>
+            <a:r>
+              <a:rPr lang="en-US" baseline="0" dirty="0" smtClean="0"/>
+              <a:t>Again, integration is important, and would be very nice to use.</a:t>
+            </a:r>
+          </a:p>
+          <a:p>
+            <a:endParaRPr lang="en-US" baseline="0" dirty="0" smtClean="0"/>
+          </a:p>
+          <a:p>
+            <a:endParaRPr lang="en-US" dirty="0"/>
+          </a:p>
+        </p:txBody>
+      </p:sp>
+      <p:sp>
+        <p:nvSpPr>
+          <p:cNvPr id="4" name="Slide Number Placeholder 3"/>
+          <p:cNvSpPr>
+            <a:spLocks noGrp="1"/>
+          </p:cNvSpPr>
+          <p:nvPr>
+            <p:ph type="sldNum" sz="quarter" idx="10"/>
+          </p:nvPr>
+        </p:nvSpPr>
+        <p:spPr/>
+        <p:txBody>
+          <a:bodyPr/>
+          <a:lstStyle/>
+          <a:p>
+            <a:fld id="{DC99A9F5-0CA7-4C48-B068-D3E0CFA2D3C2}" type="slidenum">
+              <a:rPr lang="en-US" smtClean="0"/>
+              <a:t>9</a:t>
+            </a:fld>
+            <a:endParaRPr lang="en-US"/>
+          </a:p>
+        </p:txBody>
+      </p:sp>
+    </p:spTree>
+    <p:extLst>
+      <p:ext uri="{BB962C8B-B14F-4D97-AF65-F5344CB8AC3E}">
+        <p14:creationId xmlns:p14="http://schemas.microsoft.com/office/powerpoint/2010/main" val="717567569"/>
+      </p:ext>
+    </p:extLst>
+  </p:cSld>
+  <p:clrMapOvr>
+    <a:masterClrMapping/>
+  </p:clrMapOvr>
+</p:notes>
+</file>
+
 <file path=ppt/slideLayouts/slideLayout1.xml><?xml version="1.0" encoding="utf-8"?>
 <p:sldLayout xmlns:a="http://schemas.openxmlformats.org/drawingml/2006/main" xmlns:r="http://schemas.openxmlformats.org/officeDocument/2006/relationships" xmlns:p="http://schemas.openxmlformats.org/presentationml/2006/main" showMasterSp="0" type="title" preserve="1">
   <p:cSld name="Title Slide">
@@ -866,8 +1205,8 @@
           </a:prstGeom>
           <a:noFill/>
           <a:extLst>
-            <a:ext uri="{909E8E84-426E-40dd-AFC4-6F175D3DCCD1}">
-              <a14:hiddenFill xmlns:a14="http://schemas.microsoft.com/office/drawing/2010/main" xmlns="">
+            <a:ext uri="{909E8E84-426E-40DD-AFC4-6F175D3DCCD1}">
+              <a14:hiddenFill xmlns:a14="http://schemas.microsoft.com/office/drawing/2010/main">
                 <a:solidFill>
                   <a:srgbClr val="FFFFFF"/>
                 </a:solidFill>
@@ -926,8 +1265,8 @@
               <a:noFill/>
             </a:ln>
             <a:extLst>
-              <a:ext uri="{91240B29-F687-4f45-9708-019B960494DF}">
-                <a14:hiddenLine xmlns:a14="http://schemas.microsoft.com/office/drawing/2010/main" xmlns="" w="9525">
+              <a:ext uri="{91240B29-F687-4F45-9708-019B960494DF}">
+                <a14:hiddenLine xmlns:a14="http://schemas.microsoft.com/office/drawing/2010/main" w="9525">
                   <a:solidFill>
                     <a:srgbClr val="000000"/>
                   </a:solidFill>
@@ -1016,8 +1355,8 @@
               <a:noFill/>
             </a:ln>
             <a:extLst>
-              <a:ext uri="{91240B29-F687-4f45-9708-019B960494DF}">
-                <a14:hiddenLine xmlns:a14="http://schemas.microsoft.com/office/drawing/2010/main" xmlns="" w="9525">
+              <a:ext uri="{91240B29-F687-4F45-9708-019B960494DF}">
+                <a14:hiddenLine xmlns:a14="http://schemas.microsoft.com/office/drawing/2010/main" w="9525">
                   <a:solidFill>
                     <a:srgbClr val="000000"/>
                   </a:solidFill>
@@ -1106,8 +1445,8 @@
               <a:noFill/>
             </a:ln>
             <a:extLst>
-              <a:ext uri="{91240B29-F687-4f45-9708-019B960494DF}">
-                <a14:hiddenLine xmlns:a14="http://schemas.microsoft.com/office/drawing/2010/main" xmlns="" w="9525">
+              <a:ext uri="{91240B29-F687-4F45-9708-019B960494DF}">
+                <a14:hiddenLine xmlns:a14="http://schemas.microsoft.com/office/drawing/2010/main" w="9525">
                   <a:solidFill>
                     <a:srgbClr val="000000"/>
                   </a:solidFill>
@@ -1140,8 +1479,8 @@
               <a:noFill/>
             </a:ln>
             <a:extLst>
-              <a:ext uri="{91240B29-F687-4f45-9708-019B960494DF}">
-                <a14:hiddenLine xmlns:a14="http://schemas.microsoft.com/office/drawing/2010/main" xmlns="" w="9525">
+              <a:ext uri="{91240B29-F687-4F45-9708-019B960494DF}">
+                <a14:hiddenLine xmlns:a14="http://schemas.microsoft.com/office/drawing/2010/main" w="9525">
                   <a:solidFill>
                     <a:srgbClr val="000000"/>
                   </a:solidFill>
@@ -1230,8 +1569,8 @@
               <a:noFill/>
             </a:ln>
             <a:extLst>
-              <a:ext uri="{91240B29-F687-4f45-9708-019B960494DF}">
-                <a14:hiddenLine xmlns:a14="http://schemas.microsoft.com/office/drawing/2010/main" xmlns="" w="9525">
+              <a:ext uri="{91240B29-F687-4F45-9708-019B960494DF}">
+                <a14:hiddenLine xmlns:a14="http://schemas.microsoft.com/office/drawing/2010/main" w="9525">
                   <a:solidFill>
                     <a:srgbClr val="000000"/>
                   </a:solidFill>
@@ -1292,8 +1631,8 @@
               <a:noFill/>
             </a:ln>
             <a:extLst>
-              <a:ext uri="{91240B29-F687-4f45-9708-019B960494DF}">
-                <a14:hiddenLine xmlns:a14="http://schemas.microsoft.com/office/drawing/2010/main" xmlns="" w="9525">
+              <a:ext uri="{91240B29-F687-4F45-9708-019B960494DF}">
+                <a14:hiddenLine xmlns:a14="http://schemas.microsoft.com/office/drawing/2010/main" w="9525">
                   <a:solidFill>
                     <a:srgbClr val="000000"/>
                   </a:solidFill>
@@ -1354,8 +1693,8 @@
               <a:noFill/>
             </a:ln>
             <a:extLst>
-              <a:ext uri="{91240B29-F687-4f45-9708-019B960494DF}">
-                <a14:hiddenLine xmlns:a14="http://schemas.microsoft.com/office/drawing/2010/main" xmlns="" w="9525">
+              <a:ext uri="{91240B29-F687-4F45-9708-019B960494DF}">
+                <a14:hiddenLine xmlns:a14="http://schemas.microsoft.com/office/drawing/2010/main" w="9525">
                   <a:solidFill>
                     <a:srgbClr val="000000"/>
                   </a:solidFill>
@@ -1444,8 +1783,8 @@
               <a:noFill/>
             </a:ln>
             <a:extLst>
-              <a:ext uri="{91240B29-F687-4f45-9708-019B960494DF}">
-                <a14:hiddenLine xmlns:a14="http://schemas.microsoft.com/office/drawing/2010/main" xmlns="" w="9525">
+              <a:ext uri="{91240B29-F687-4F45-9708-019B960494DF}">
+                <a14:hiddenLine xmlns:a14="http://schemas.microsoft.com/office/drawing/2010/main" w="9525">
                   <a:solidFill>
                     <a:srgbClr val="000000"/>
                   </a:solidFill>
@@ -1506,8 +1845,8 @@
               <a:noFill/>
             </a:ln>
             <a:extLst>
-              <a:ext uri="{91240B29-F687-4f45-9708-019B960494DF}">
-                <a14:hiddenLine xmlns:a14="http://schemas.microsoft.com/office/drawing/2010/main" xmlns="" w="9525">
+              <a:ext uri="{91240B29-F687-4F45-9708-019B960494DF}">
+                <a14:hiddenLine xmlns:a14="http://schemas.microsoft.com/office/drawing/2010/main" w="9525">
                   <a:solidFill>
                     <a:srgbClr val="000000"/>
                   </a:solidFill>
@@ -1568,8 +1907,8 @@
               <a:noFill/>
             </a:ln>
             <a:extLst>
-              <a:ext uri="{91240B29-F687-4f45-9708-019B960494DF}">
-                <a14:hiddenLine xmlns:a14="http://schemas.microsoft.com/office/drawing/2010/main" xmlns="" w="9525">
+              <a:ext uri="{91240B29-F687-4F45-9708-019B960494DF}">
+                <a14:hiddenLine xmlns:a14="http://schemas.microsoft.com/office/drawing/2010/main" w="9525">
                   <a:solidFill>
                     <a:srgbClr val="000000"/>
                   </a:solidFill>
@@ -1658,8 +1997,8 @@
               <a:noFill/>
             </a:ln>
             <a:extLst>
-              <a:ext uri="{91240B29-F687-4f45-9708-019B960494DF}">
-                <a14:hiddenLine xmlns:a14="http://schemas.microsoft.com/office/drawing/2010/main" xmlns="" w="9525">
+              <a:ext uri="{91240B29-F687-4F45-9708-019B960494DF}">
+                <a14:hiddenLine xmlns:a14="http://schemas.microsoft.com/office/drawing/2010/main" w="9525">
                   <a:solidFill>
                     <a:srgbClr val="000000"/>
                   </a:solidFill>
@@ -1748,8 +2087,8 @@
               <a:noFill/>
             </a:ln>
             <a:extLst>
-              <a:ext uri="{91240B29-F687-4f45-9708-019B960494DF}">
-                <a14:hiddenLine xmlns:a14="http://schemas.microsoft.com/office/drawing/2010/main" xmlns="" w="9525">
+              <a:ext uri="{91240B29-F687-4F45-9708-019B960494DF}">
+                <a14:hiddenLine xmlns:a14="http://schemas.microsoft.com/office/drawing/2010/main" w="9525">
                   <a:solidFill>
                     <a:srgbClr val="000000"/>
                   </a:solidFill>
@@ -1810,8 +2149,8 @@
               <a:noFill/>
             </a:ln>
             <a:extLst>
-              <a:ext uri="{91240B29-F687-4f45-9708-019B960494DF}">
-                <a14:hiddenLine xmlns:a14="http://schemas.microsoft.com/office/drawing/2010/main" xmlns="" w="9525">
+              <a:ext uri="{91240B29-F687-4F45-9708-019B960494DF}">
+                <a14:hiddenLine xmlns:a14="http://schemas.microsoft.com/office/drawing/2010/main" w="9525">
                   <a:solidFill>
                     <a:srgbClr val="000000"/>
                   </a:solidFill>
@@ -1920,8 +2259,8 @@
               <a:noFill/>
             </a:ln>
             <a:extLst>
-              <a:ext uri="{91240B29-F687-4f45-9708-019B960494DF}">
-                <a14:hiddenLine xmlns:a14="http://schemas.microsoft.com/office/drawing/2010/main" xmlns="" w="9525">
+              <a:ext uri="{91240B29-F687-4F45-9708-019B960494DF}">
+                <a14:hiddenLine xmlns:a14="http://schemas.microsoft.com/office/drawing/2010/main" w="9525">
                   <a:solidFill>
                     <a:srgbClr val="000000"/>
                   </a:solidFill>
@@ -1982,8 +2321,8 @@
               <a:noFill/>
             </a:ln>
             <a:extLst>
-              <a:ext uri="{91240B29-F687-4f45-9708-019B960494DF}">
-                <a14:hiddenLine xmlns:a14="http://schemas.microsoft.com/office/drawing/2010/main" xmlns="" w="9525">
+              <a:ext uri="{91240B29-F687-4F45-9708-019B960494DF}">
+                <a14:hiddenLine xmlns:a14="http://schemas.microsoft.com/office/drawing/2010/main" w="9525">
                   <a:solidFill>
                     <a:srgbClr val="000000"/>
                   </a:solidFill>
@@ -2072,8 +2411,8 @@
               <a:noFill/>
             </a:ln>
             <a:extLst>
-              <a:ext uri="{91240B29-F687-4f45-9708-019B960494DF}">
-                <a14:hiddenLine xmlns:a14="http://schemas.microsoft.com/office/drawing/2010/main" xmlns="" w="9525">
+              <a:ext uri="{91240B29-F687-4F45-9708-019B960494DF}">
+                <a14:hiddenLine xmlns:a14="http://schemas.microsoft.com/office/drawing/2010/main" w="9525">
                   <a:solidFill>
                     <a:srgbClr val="000000"/>
                   </a:solidFill>
@@ -2162,8 +2501,8 @@
               <a:noFill/>
             </a:ln>
             <a:extLst>
-              <a:ext uri="{91240B29-F687-4f45-9708-019B960494DF}">
-                <a14:hiddenLine xmlns:a14="http://schemas.microsoft.com/office/drawing/2010/main" xmlns="" w="9525">
+              <a:ext uri="{91240B29-F687-4F45-9708-019B960494DF}">
+                <a14:hiddenLine xmlns:a14="http://schemas.microsoft.com/office/drawing/2010/main" w="9525">
                   <a:solidFill>
                     <a:srgbClr val="000000"/>
                   </a:solidFill>
@@ -2224,8 +2563,8 @@
               <a:noFill/>
             </a:ln>
             <a:extLst>
-              <a:ext uri="{91240B29-F687-4f45-9708-019B960494DF}">
-                <a14:hiddenLine xmlns:a14="http://schemas.microsoft.com/office/drawing/2010/main" xmlns="" w="9525">
+              <a:ext uri="{91240B29-F687-4F45-9708-019B960494DF}">
+                <a14:hiddenLine xmlns:a14="http://schemas.microsoft.com/office/drawing/2010/main" w="9525">
                   <a:solidFill>
                     <a:srgbClr val="000000"/>
                   </a:solidFill>
@@ -2314,8 +2653,8 @@
               <a:noFill/>
             </a:ln>
             <a:extLst>
-              <a:ext uri="{91240B29-F687-4f45-9708-019B960494DF}">
-                <a14:hiddenLine xmlns:a14="http://schemas.microsoft.com/office/drawing/2010/main" xmlns="" w="9525">
+              <a:ext uri="{91240B29-F687-4F45-9708-019B960494DF}">
+                <a14:hiddenLine xmlns:a14="http://schemas.microsoft.com/office/drawing/2010/main" w="9525">
                   <a:solidFill>
                     <a:srgbClr val="000000"/>
                   </a:solidFill>
@@ -2404,8 +2743,8 @@
               <a:noFill/>
             </a:ln>
             <a:extLst>
-              <a:ext uri="{91240B29-F687-4f45-9708-019B960494DF}">
-                <a14:hiddenLine xmlns:a14="http://schemas.microsoft.com/office/drawing/2010/main" xmlns="" w="9525">
+              <a:ext uri="{91240B29-F687-4F45-9708-019B960494DF}">
+                <a14:hiddenLine xmlns:a14="http://schemas.microsoft.com/office/drawing/2010/main" w="9525">
                   <a:solidFill>
                     <a:srgbClr val="000000"/>
                   </a:solidFill>
@@ -2460,8 +2799,8 @@
               <a:noFill/>
             </a:ln>
             <a:extLst>
-              <a:ext uri="{91240B29-F687-4f45-9708-019B960494DF}">
-                <a14:hiddenLine xmlns:a14="http://schemas.microsoft.com/office/drawing/2010/main" xmlns="" w="9525">
+              <a:ext uri="{91240B29-F687-4F45-9708-019B960494DF}">
+                <a14:hiddenLine xmlns:a14="http://schemas.microsoft.com/office/drawing/2010/main" w="9525">
                   <a:solidFill>
                     <a:srgbClr val="000000"/>
                   </a:solidFill>
@@ -2550,8 +2889,8 @@
               <a:noFill/>
             </a:ln>
             <a:extLst>
-              <a:ext uri="{91240B29-F687-4f45-9708-019B960494DF}">
-                <a14:hiddenLine xmlns:a14="http://schemas.microsoft.com/office/drawing/2010/main" xmlns="" w="9525">
+              <a:ext uri="{91240B29-F687-4F45-9708-019B960494DF}">
+                <a14:hiddenLine xmlns:a14="http://schemas.microsoft.com/office/drawing/2010/main" w="9525">
                   <a:solidFill>
                     <a:srgbClr val="000000"/>
                   </a:solidFill>
@@ -2606,8 +2945,8 @@
               <a:noFill/>
             </a:ln>
             <a:extLst>
-              <a:ext uri="{91240B29-F687-4f45-9708-019B960494DF}">
-                <a14:hiddenLine xmlns:a14="http://schemas.microsoft.com/office/drawing/2010/main" xmlns="" w="9525">
+              <a:ext uri="{91240B29-F687-4F45-9708-019B960494DF}">
+                <a14:hiddenLine xmlns:a14="http://schemas.microsoft.com/office/drawing/2010/main" w="9525">
                   <a:solidFill>
                     <a:srgbClr val="000000"/>
                   </a:solidFill>
@@ -2696,8 +3035,8 @@
               <a:noFill/>
             </a:ln>
             <a:extLst>
-              <a:ext uri="{91240B29-F687-4f45-9708-019B960494DF}">
-                <a14:hiddenLine xmlns:a14="http://schemas.microsoft.com/office/drawing/2010/main" xmlns="" w="9525">
+              <a:ext uri="{91240B29-F687-4F45-9708-019B960494DF}">
+                <a14:hiddenLine xmlns:a14="http://schemas.microsoft.com/office/drawing/2010/main" w="9525">
                   <a:solidFill>
                     <a:srgbClr val="000000"/>
                   </a:solidFill>
@@ -2764,8 +3103,8 @@
               <a:noFill/>
             </a:ln>
             <a:extLst>
-              <a:ext uri="{91240B29-F687-4f45-9708-019B960494DF}">
-                <a14:hiddenLine xmlns:a14="http://schemas.microsoft.com/office/drawing/2010/main" xmlns="" w="9525">
+              <a:ext uri="{91240B29-F687-4F45-9708-019B960494DF}">
+                <a14:hiddenLine xmlns:a14="http://schemas.microsoft.com/office/drawing/2010/main" w="9525">
                   <a:solidFill>
                     <a:srgbClr val="000000"/>
                   </a:solidFill>
@@ -2854,8 +3193,8 @@
               <a:noFill/>
             </a:ln>
             <a:extLst>
-              <a:ext uri="{91240B29-F687-4f45-9708-019B960494DF}">
-                <a14:hiddenLine xmlns:a14="http://schemas.microsoft.com/office/drawing/2010/main" xmlns="" w="9525">
+              <a:ext uri="{91240B29-F687-4F45-9708-019B960494DF}">
+                <a14:hiddenLine xmlns:a14="http://schemas.microsoft.com/office/drawing/2010/main" w="9525">
                   <a:solidFill>
                     <a:srgbClr val="000000"/>
                   </a:solidFill>
@@ -2922,8 +3261,8 @@
               <a:noFill/>
             </a:ln>
             <a:extLst>
-              <a:ext uri="{91240B29-F687-4f45-9708-019B960494DF}">
-                <a14:hiddenLine xmlns:a14="http://schemas.microsoft.com/office/drawing/2010/main" xmlns="" w="9525">
+              <a:ext uri="{91240B29-F687-4F45-9708-019B960494DF}">
+                <a14:hiddenLine xmlns:a14="http://schemas.microsoft.com/office/drawing/2010/main" w="9525">
                   <a:solidFill>
                     <a:srgbClr val="000000"/>
                   </a:solidFill>
@@ -3012,8 +3351,8 @@
               <a:noFill/>
             </a:ln>
             <a:extLst>
-              <a:ext uri="{91240B29-F687-4f45-9708-019B960494DF}">
-                <a14:hiddenLine xmlns:a14="http://schemas.microsoft.com/office/drawing/2010/main" xmlns="" w="9525">
+              <a:ext uri="{91240B29-F687-4F45-9708-019B960494DF}">
+                <a14:hiddenLine xmlns:a14="http://schemas.microsoft.com/office/drawing/2010/main" w="9525">
                   <a:solidFill>
                     <a:srgbClr val="000000"/>
                   </a:solidFill>
@@ -3046,8 +3385,8 @@
               <a:noFill/>
             </a:ln>
             <a:extLst>
-              <a:ext uri="{91240B29-F687-4f45-9708-019B960494DF}">
-                <a14:hiddenLine xmlns:a14="http://schemas.microsoft.com/office/drawing/2010/main" xmlns="" w="9525">
+              <a:ext uri="{91240B29-F687-4F45-9708-019B960494DF}">
+                <a14:hiddenLine xmlns:a14="http://schemas.microsoft.com/office/drawing/2010/main" w="9525">
                   <a:solidFill>
                     <a:srgbClr val="000000"/>
                   </a:solidFill>
@@ -3136,8 +3475,8 @@
               <a:noFill/>
             </a:ln>
             <a:extLst>
-              <a:ext uri="{91240B29-F687-4f45-9708-019B960494DF}">
-                <a14:hiddenLine xmlns:a14="http://schemas.microsoft.com/office/drawing/2010/main" xmlns="" w="9525">
+              <a:ext uri="{91240B29-F687-4F45-9708-019B960494DF}">
+                <a14:hiddenLine xmlns:a14="http://schemas.microsoft.com/office/drawing/2010/main" w="9525">
                   <a:solidFill>
                     <a:srgbClr val="000000"/>
                   </a:solidFill>
@@ -3198,8 +3537,8 @@
               <a:noFill/>
             </a:ln>
             <a:extLst>
-              <a:ext uri="{91240B29-F687-4f45-9708-019B960494DF}">
-                <a14:hiddenLine xmlns:a14="http://schemas.microsoft.com/office/drawing/2010/main" xmlns="" w="9525">
+              <a:ext uri="{91240B29-F687-4F45-9708-019B960494DF}">
+                <a14:hiddenLine xmlns:a14="http://schemas.microsoft.com/office/drawing/2010/main" w="9525">
                   <a:solidFill>
                     <a:srgbClr val="000000"/>
                   </a:solidFill>
@@ -3260,8 +3599,8 @@
               <a:noFill/>
             </a:ln>
             <a:extLst>
-              <a:ext uri="{91240B29-F687-4f45-9708-019B960494DF}">
-                <a14:hiddenLine xmlns:a14="http://schemas.microsoft.com/office/drawing/2010/main" xmlns="" w="9525">
+              <a:ext uri="{91240B29-F687-4F45-9708-019B960494DF}">
+                <a14:hiddenLine xmlns:a14="http://schemas.microsoft.com/office/drawing/2010/main" w="9525">
                   <a:solidFill>
                     <a:srgbClr val="000000"/>
                   </a:solidFill>
@@ -3350,8 +3689,8 @@
               <a:noFill/>
             </a:ln>
             <a:extLst>
-              <a:ext uri="{91240B29-F687-4f45-9708-019B960494DF}">
-                <a14:hiddenLine xmlns:a14="http://schemas.microsoft.com/office/drawing/2010/main" xmlns="" w="9525">
+              <a:ext uri="{91240B29-F687-4F45-9708-019B960494DF}">
+                <a14:hiddenLine xmlns:a14="http://schemas.microsoft.com/office/drawing/2010/main" w="9525">
                   <a:solidFill>
                     <a:srgbClr val="000000"/>
                   </a:solidFill>
@@ -3418,8 +3757,8 @@
               <a:noFill/>
             </a:ln>
             <a:extLst>
-              <a:ext uri="{91240B29-F687-4f45-9708-019B960494DF}">
-                <a14:hiddenLine xmlns:a14="http://schemas.microsoft.com/office/drawing/2010/main" xmlns="" w="9525">
+              <a:ext uri="{91240B29-F687-4F45-9708-019B960494DF}">
+                <a14:hiddenLine xmlns:a14="http://schemas.microsoft.com/office/drawing/2010/main" w="9525">
                   <a:solidFill>
                     <a:srgbClr val="000000"/>
                   </a:solidFill>
@@ -3480,8 +3819,8 @@
               <a:noFill/>
             </a:ln>
             <a:extLst>
-              <a:ext uri="{91240B29-F687-4f45-9708-019B960494DF}">
-                <a14:hiddenLine xmlns:a14="http://schemas.microsoft.com/office/drawing/2010/main" xmlns="" w="9525">
+              <a:ext uri="{91240B29-F687-4F45-9708-019B960494DF}">
+                <a14:hiddenLine xmlns:a14="http://schemas.microsoft.com/office/drawing/2010/main" w="9525">
                   <a:solidFill>
                     <a:srgbClr val="000000"/>
                   </a:solidFill>
@@ -3570,8 +3909,8 @@
               <a:noFill/>
             </a:ln>
             <a:extLst>
-              <a:ext uri="{91240B29-F687-4f45-9708-019B960494DF}">
-                <a14:hiddenLine xmlns:a14="http://schemas.microsoft.com/office/drawing/2010/main" xmlns="" w="9525">
+              <a:ext uri="{91240B29-F687-4F45-9708-019B960494DF}">
+                <a14:hiddenLine xmlns:a14="http://schemas.microsoft.com/office/drawing/2010/main" w="9525">
                   <a:solidFill>
                     <a:srgbClr val="000000"/>
                   </a:solidFill>
@@ -3632,8 +3971,8 @@
               <a:noFill/>
             </a:ln>
             <a:extLst>
-              <a:ext uri="{91240B29-F687-4f45-9708-019B960494DF}">
-                <a14:hiddenLine xmlns:a14="http://schemas.microsoft.com/office/drawing/2010/main" xmlns="" w="9525">
+              <a:ext uri="{91240B29-F687-4F45-9708-019B960494DF}">
+                <a14:hiddenLine xmlns:a14="http://schemas.microsoft.com/office/drawing/2010/main" w="9525">
                   <a:solidFill>
                     <a:srgbClr val="000000"/>
                   </a:solidFill>
@@ -3722,8 +4061,8 @@
               <a:noFill/>
             </a:ln>
             <a:extLst>
-              <a:ext uri="{91240B29-F687-4f45-9708-019B960494DF}">
-                <a14:hiddenLine xmlns:a14="http://schemas.microsoft.com/office/drawing/2010/main" xmlns="" w="9525">
+              <a:ext uri="{91240B29-F687-4F45-9708-019B960494DF}">
+                <a14:hiddenLine xmlns:a14="http://schemas.microsoft.com/office/drawing/2010/main" w="9525">
                   <a:solidFill>
                     <a:srgbClr val="000000"/>
                   </a:solidFill>
@@ -3784,8 +4123,8 @@
               <a:noFill/>
             </a:ln>
             <a:extLst>
-              <a:ext uri="{91240B29-F687-4f45-9708-019B960494DF}">
-                <a14:hiddenLine xmlns:a14="http://schemas.microsoft.com/office/drawing/2010/main" xmlns="" w="9525">
+              <a:ext uri="{91240B29-F687-4F45-9708-019B960494DF}">
+                <a14:hiddenLine xmlns:a14="http://schemas.microsoft.com/office/drawing/2010/main" w="9525">
                   <a:solidFill>
                     <a:srgbClr val="000000"/>
                   </a:solidFill>
@@ -3874,8 +4213,8 @@
               <a:noFill/>
             </a:ln>
             <a:extLst>
-              <a:ext uri="{91240B29-F687-4f45-9708-019B960494DF}">
-                <a14:hiddenLine xmlns:a14="http://schemas.microsoft.com/office/drawing/2010/main" xmlns="" w="9525">
+              <a:ext uri="{91240B29-F687-4F45-9708-019B960494DF}">
+                <a14:hiddenLine xmlns:a14="http://schemas.microsoft.com/office/drawing/2010/main" w="9525">
                   <a:solidFill>
                     <a:srgbClr val="000000"/>
                   </a:solidFill>
@@ -3908,8 +4247,8 @@
               <a:noFill/>
             </a:ln>
             <a:extLst>
-              <a:ext uri="{91240B29-F687-4f45-9708-019B960494DF}">
-                <a14:hiddenLine xmlns:a14="http://schemas.microsoft.com/office/drawing/2010/main" xmlns="" w="9525">
+              <a:ext uri="{91240B29-F687-4F45-9708-019B960494DF}">
+                <a14:hiddenLine xmlns:a14="http://schemas.microsoft.com/office/drawing/2010/main" w="9525">
                   <a:solidFill>
                     <a:srgbClr val="000000"/>
                   </a:solidFill>
@@ -3973,8 +4312,8 @@
               <a:noFill/>
             </a:ln>
             <a:extLst>
-              <a:ext uri="{91240B29-F687-4f45-9708-019B960494DF}">
-                <a14:hiddenLine xmlns:a14="http://schemas.microsoft.com/office/drawing/2010/main" xmlns="" w="9525">
+              <a:ext uri="{91240B29-F687-4F45-9708-019B960494DF}">
+                <a14:hiddenLine xmlns:a14="http://schemas.microsoft.com/office/drawing/2010/main" w="9525">
                   <a:solidFill>
                     <a:srgbClr val="000000"/>
                   </a:solidFill>
@@ -4063,8 +4402,8 @@
               <a:noFill/>
             </a:ln>
             <a:extLst>
-              <a:ext uri="{91240B29-F687-4f45-9708-019B960494DF}">
-                <a14:hiddenLine xmlns:a14="http://schemas.microsoft.com/office/drawing/2010/main" xmlns="" w="9525">
+              <a:ext uri="{91240B29-F687-4F45-9708-019B960494DF}">
+                <a14:hiddenLine xmlns:a14="http://schemas.microsoft.com/office/drawing/2010/main" w="9525">
                   <a:solidFill>
                     <a:srgbClr val="000000"/>
                   </a:solidFill>
@@ -4125,8 +4464,8 @@
               <a:noFill/>
             </a:ln>
             <a:extLst>
-              <a:ext uri="{91240B29-F687-4f45-9708-019B960494DF}">
-                <a14:hiddenLine xmlns:a14="http://schemas.microsoft.com/office/drawing/2010/main" xmlns="" w="9525">
+              <a:ext uri="{91240B29-F687-4F45-9708-019B960494DF}">
+                <a14:hiddenLine xmlns:a14="http://schemas.microsoft.com/office/drawing/2010/main" w="9525">
                   <a:solidFill>
                     <a:srgbClr val="000000"/>
                   </a:solidFill>
@@ -4215,8 +4554,8 @@
               <a:noFill/>
             </a:ln>
             <a:extLst>
-              <a:ext uri="{91240B29-F687-4f45-9708-019B960494DF}">
-                <a14:hiddenLine xmlns:a14="http://schemas.microsoft.com/office/drawing/2010/main" xmlns="" w="9525">
+              <a:ext uri="{91240B29-F687-4F45-9708-019B960494DF}">
+                <a14:hiddenLine xmlns:a14="http://schemas.microsoft.com/office/drawing/2010/main" w="9525">
                   <a:solidFill>
                     <a:srgbClr val="000000"/>
                   </a:solidFill>
@@ -4305,8 +4644,8 @@
               <a:noFill/>
             </a:ln>
             <a:extLst>
-              <a:ext uri="{91240B29-F687-4f45-9708-019B960494DF}">
-                <a14:hiddenLine xmlns:a14="http://schemas.microsoft.com/office/drawing/2010/main" xmlns="" w="9525">
+              <a:ext uri="{91240B29-F687-4F45-9708-019B960494DF}">
+                <a14:hiddenLine xmlns:a14="http://schemas.microsoft.com/office/drawing/2010/main" w="9525">
                   <a:solidFill>
                     <a:srgbClr val="000000"/>
                   </a:solidFill>
@@ -4370,8 +4709,8 @@
               <a:noFill/>
             </a:ln>
             <a:extLst>
-              <a:ext uri="{91240B29-F687-4f45-9708-019B960494DF}">
-                <a14:hiddenLine xmlns:a14="http://schemas.microsoft.com/office/drawing/2010/main" xmlns="" w="9525">
+              <a:ext uri="{91240B29-F687-4F45-9708-019B960494DF}">
+                <a14:hiddenLine xmlns:a14="http://schemas.microsoft.com/office/drawing/2010/main" w="9525">
                   <a:solidFill>
                     <a:srgbClr val="000000"/>
                   </a:solidFill>
@@ -4432,8 +4771,8 @@
               <a:noFill/>
             </a:ln>
             <a:extLst>
-              <a:ext uri="{91240B29-F687-4f45-9708-019B960494DF}">
-                <a14:hiddenLine xmlns:a14="http://schemas.microsoft.com/office/drawing/2010/main" xmlns="" w="9525">
+              <a:ext uri="{91240B29-F687-4F45-9708-019B960494DF}">
+                <a14:hiddenLine xmlns:a14="http://schemas.microsoft.com/office/drawing/2010/main" w="9525">
                   <a:solidFill>
                     <a:srgbClr val="000000"/>
                   </a:solidFill>
@@ -4522,8 +4861,8 @@
               <a:noFill/>
             </a:ln>
             <a:extLst>
-              <a:ext uri="{91240B29-F687-4f45-9708-019B960494DF}">
-                <a14:hiddenLine xmlns:a14="http://schemas.microsoft.com/office/drawing/2010/main" xmlns="" w="9525">
+              <a:ext uri="{91240B29-F687-4F45-9708-019B960494DF}">
+                <a14:hiddenLine xmlns:a14="http://schemas.microsoft.com/office/drawing/2010/main" w="9525">
                   <a:solidFill>
                     <a:srgbClr val="000000"/>
                   </a:solidFill>
@@ -4612,8 +4951,8 @@
               <a:noFill/>
             </a:ln>
             <a:extLst>
-              <a:ext uri="{91240B29-F687-4f45-9708-019B960494DF}">
-                <a14:hiddenLine xmlns:a14="http://schemas.microsoft.com/office/drawing/2010/main" xmlns="" w="9525">
+              <a:ext uri="{91240B29-F687-4F45-9708-019B960494DF}">
+                <a14:hiddenLine xmlns:a14="http://schemas.microsoft.com/office/drawing/2010/main" w="9525">
                   <a:solidFill>
                     <a:srgbClr val="000000"/>
                   </a:solidFill>
@@ -4674,8 +5013,8 @@
               <a:noFill/>
             </a:ln>
             <a:extLst>
-              <a:ext uri="{91240B29-F687-4f45-9708-019B960494DF}">
-                <a14:hiddenLine xmlns:a14="http://schemas.microsoft.com/office/drawing/2010/main" xmlns="" w="9525">
+              <a:ext uri="{91240B29-F687-4F45-9708-019B960494DF}">
+                <a14:hiddenLine xmlns:a14="http://schemas.microsoft.com/office/drawing/2010/main" w="9525">
                   <a:solidFill>
                     <a:srgbClr val="000000"/>
                   </a:solidFill>
@@ -4794,8 +5133,8 @@
               <a:noFill/>
             </a:ln>
             <a:extLst>
-              <a:ext uri="{91240B29-F687-4f45-9708-019B960494DF}">
-                <a14:hiddenLine xmlns:a14="http://schemas.microsoft.com/office/drawing/2010/main" xmlns="" w="9525">
+              <a:ext uri="{91240B29-F687-4F45-9708-019B960494DF}">
+                <a14:hiddenLine xmlns:a14="http://schemas.microsoft.com/office/drawing/2010/main" w="9525">
                   <a:solidFill>
                     <a:srgbClr val="000000"/>
                   </a:solidFill>
@@ -4862,8 +5201,8 @@
               <a:noFill/>
             </a:ln>
             <a:extLst>
-              <a:ext uri="{91240B29-F687-4f45-9708-019B960494DF}">
-                <a14:hiddenLine xmlns:a14="http://schemas.microsoft.com/office/drawing/2010/main" xmlns="" w="9525">
+              <a:ext uri="{91240B29-F687-4F45-9708-019B960494DF}">
+                <a14:hiddenLine xmlns:a14="http://schemas.microsoft.com/office/drawing/2010/main" w="9525">
                   <a:solidFill>
                     <a:srgbClr val="000000"/>
                   </a:solidFill>
@@ -4952,8 +5291,8 @@
               <a:noFill/>
             </a:ln>
             <a:extLst>
-              <a:ext uri="{91240B29-F687-4f45-9708-019B960494DF}">
-                <a14:hiddenLine xmlns:a14="http://schemas.microsoft.com/office/drawing/2010/main" xmlns="" w="9525">
+              <a:ext uri="{91240B29-F687-4F45-9708-019B960494DF}">
+                <a14:hiddenLine xmlns:a14="http://schemas.microsoft.com/office/drawing/2010/main" w="9525">
                   <a:solidFill>
                     <a:srgbClr val="000000"/>
                   </a:solidFill>
@@ -9759,8 +10098,8 @@
           </a:prstGeom>
           <a:noFill/>
           <a:extLst>
-            <a:ext uri="{909E8E84-426E-40dd-AFC4-6F175D3DCCD1}">
-              <a14:hiddenFill xmlns:a14="http://schemas.microsoft.com/office/drawing/2010/main" xmlns="">
+            <a:ext uri="{909E8E84-426E-40DD-AFC4-6F175D3DCCD1}">
+              <a14:hiddenFill xmlns:a14="http://schemas.microsoft.com/office/drawing/2010/main">
                 <a:solidFill>
                   <a:srgbClr val="FFFFFF"/>
                 </a:solidFill>
@@ -9833,8 +10172,8 @@
                 <a:noFill/>
               </a:ln>
               <a:extLst>
-                <a:ext uri="{91240B29-F687-4f45-9708-019B960494DF}">
-                  <a14:hiddenLine xmlns:a14="http://schemas.microsoft.com/office/drawing/2010/main" xmlns="" w="9525">
+                <a:ext uri="{91240B29-F687-4F45-9708-019B960494DF}">
+                  <a14:hiddenLine xmlns:a14="http://schemas.microsoft.com/office/drawing/2010/main" w="9525">
                     <a:solidFill>
                       <a:srgbClr val="000000"/>
                     </a:solidFill>
@@ -9923,8 +10262,8 @@
                 <a:noFill/>
               </a:ln>
               <a:extLst>
-                <a:ext uri="{91240B29-F687-4f45-9708-019B960494DF}">
-                  <a14:hiddenLine xmlns:a14="http://schemas.microsoft.com/office/drawing/2010/main" xmlns="" w="9525">
+                <a:ext uri="{91240B29-F687-4F45-9708-019B960494DF}">
+                  <a14:hiddenLine xmlns:a14="http://schemas.microsoft.com/office/drawing/2010/main" w="9525">
                     <a:solidFill>
                       <a:srgbClr val="000000"/>
                     </a:solidFill>
@@ -10013,8 +10352,8 @@
                 <a:noFill/>
               </a:ln>
               <a:extLst>
-                <a:ext uri="{91240B29-F687-4f45-9708-019B960494DF}">
-                  <a14:hiddenLine xmlns:a14="http://schemas.microsoft.com/office/drawing/2010/main" xmlns="" w="9525">
+                <a:ext uri="{91240B29-F687-4F45-9708-019B960494DF}">
+                  <a14:hiddenLine xmlns:a14="http://schemas.microsoft.com/office/drawing/2010/main" w="9525">
                     <a:solidFill>
                       <a:srgbClr val="000000"/>
                     </a:solidFill>
@@ -10075,8 +10414,8 @@
                 <a:noFill/>
               </a:ln>
               <a:extLst>
-                <a:ext uri="{91240B29-F687-4f45-9708-019B960494DF}">
-                  <a14:hiddenLine xmlns:a14="http://schemas.microsoft.com/office/drawing/2010/main" xmlns="" w="9525">
+                <a:ext uri="{91240B29-F687-4F45-9708-019B960494DF}">
+                  <a14:hiddenLine xmlns:a14="http://schemas.microsoft.com/office/drawing/2010/main" w="9525">
                     <a:solidFill>
                       <a:srgbClr val="000000"/>
                     </a:solidFill>
@@ -10165,8 +10504,8 @@
                 <a:noFill/>
               </a:ln>
               <a:extLst>
-                <a:ext uri="{91240B29-F687-4f45-9708-019B960494DF}">
-                  <a14:hiddenLine xmlns:a14="http://schemas.microsoft.com/office/drawing/2010/main" xmlns="" w="9525">
+                <a:ext uri="{91240B29-F687-4F45-9708-019B960494DF}">
+                  <a14:hiddenLine xmlns:a14="http://schemas.microsoft.com/office/drawing/2010/main" w="9525">
                     <a:solidFill>
                       <a:srgbClr val="000000"/>
                     </a:solidFill>
@@ -10227,8 +10566,8 @@
                 <a:noFill/>
               </a:ln>
               <a:extLst>
-                <a:ext uri="{91240B29-F687-4f45-9708-019B960494DF}">
-                  <a14:hiddenLine xmlns:a14="http://schemas.microsoft.com/office/drawing/2010/main" xmlns="" w="9525">
+                <a:ext uri="{91240B29-F687-4F45-9708-019B960494DF}">
+                  <a14:hiddenLine xmlns:a14="http://schemas.microsoft.com/office/drawing/2010/main" w="9525">
                     <a:solidFill>
                       <a:srgbClr val="000000"/>
                     </a:solidFill>
@@ -10289,8 +10628,8 @@
                 <a:noFill/>
               </a:ln>
               <a:extLst>
-                <a:ext uri="{91240B29-F687-4f45-9708-019B960494DF}">
-                  <a14:hiddenLine xmlns:a14="http://schemas.microsoft.com/office/drawing/2010/main" xmlns="" w="9525">
+                <a:ext uri="{91240B29-F687-4F45-9708-019B960494DF}">
+                  <a14:hiddenLine xmlns:a14="http://schemas.microsoft.com/office/drawing/2010/main" w="9525">
                     <a:solidFill>
                       <a:srgbClr val="000000"/>
                     </a:solidFill>
@@ -10379,8 +10718,8 @@
                 <a:noFill/>
               </a:ln>
               <a:extLst>
-                <a:ext uri="{91240B29-F687-4f45-9708-019B960494DF}">
-                  <a14:hiddenLine xmlns:a14="http://schemas.microsoft.com/office/drawing/2010/main" xmlns="" w="9525">
+                <a:ext uri="{91240B29-F687-4F45-9708-019B960494DF}">
+                  <a14:hiddenLine xmlns:a14="http://schemas.microsoft.com/office/drawing/2010/main" w="9525">
                     <a:solidFill>
                       <a:srgbClr val="000000"/>
                     </a:solidFill>
@@ -10469,8 +10808,8 @@
                 <a:noFill/>
               </a:ln>
               <a:extLst>
-                <a:ext uri="{91240B29-F687-4f45-9708-019B960494DF}">
-                  <a14:hiddenLine xmlns:a14="http://schemas.microsoft.com/office/drawing/2010/main" xmlns="" w="9525">
+                <a:ext uri="{91240B29-F687-4F45-9708-019B960494DF}">
+                  <a14:hiddenLine xmlns:a14="http://schemas.microsoft.com/office/drawing/2010/main" w="9525">
                     <a:solidFill>
                       <a:srgbClr val="000000"/>
                     </a:solidFill>
@@ -10531,8 +10870,8 @@
                 <a:noFill/>
               </a:ln>
               <a:extLst>
-                <a:ext uri="{91240B29-F687-4f45-9708-019B960494DF}">
-                  <a14:hiddenLine xmlns:a14="http://schemas.microsoft.com/office/drawing/2010/main" xmlns="" w="9525">
+                <a:ext uri="{91240B29-F687-4F45-9708-019B960494DF}">
+                  <a14:hiddenLine xmlns:a14="http://schemas.microsoft.com/office/drawing/2010/main" w="9525">
                     <a:solidFill>
                       <a:srgbClr val="000000"/>
                     </a:solidFill>
@@ -10641,8 +10980,8 @@
                 <a:noFill/>
               </a:ln>
               <a:extLst>
-                <a:ext uri="{91240B29-F687-4f45-9708-019B960494DF}">
-                  <a14:hiddenLine xmlns:a14="http://schemas.microsoft.com/office/drawing/2010/main" xmlns="" w="9525">
+                <a:ext uri="{91240B29-F687-4F45-9708-019B960494DF}">
+                  <a14:hiddenLine xmlns:a14="http://schemas.microsoft.com/office/drawing/2010/main" w="9525">
                     <a:solidFill>
                       <a:srgbClr val="000000"/>
                     </a:solidFill>
@@ -10725,8 +11064,8 @@
                 <a:noFill/>
               </a:ln>
               <a:extLst>
-                <a:ext uri="{91240B29-F687-4f45-9708-019B960494DF}">
-                  <a14:hiddenLine xmlns:a14="http://schemas.microsoft.com/office/drawing/2010/main" xmlns="" w="9525">
+                <a:ext uri="{91240B29-F687-4F45-9708-019B960494DF}">
+                  <a14:hiddenLine xmlns:a14="http://schemas.microsoft.com/office/drawing/2010/main" w="9525">
                     <a:solidFill>
                       <a:srgbClr val="000000"/>
                     </a:solidFill>
@@ -10787,8 +11126,8 @@
                 <a:noFill/>
               </a:ln>
               <a:extLst>
-                <a:ext uri="{91240B29-F687-4f45-9708-019B960494DF}">
-                  <a14:hiddenLine xmlns:a14="http://schemas.microsoft.com/office/drawing/2010/main" xmlns="" w="9525">
+                <a:ext uri="{91240B29-F687-4F45-9708-019B960494DF}">
+                  <a14:hiddenLine xmlns:a14="http://schemas.microsoft.com/office/drawing/2010/main" w="9525">
                     <a:solidFill>
                       <a:srgbClr val="000000"/>
                     </a:solidFill>
@@ -10849,8 +11188,8 @@
                 <a:noFill/>
               </a:ln>
               <a:extLst>
-                <a:ext uri="{91240B29-F687-4f45-9708-019B960494DF}">
-                  <a14:hiddenLine xmlns:a14="http://schemas.microsoft.com/office/drawing/2010/main" xmlns="" w="9525">
+                <a:ext uri="{91240B29-F687-4F45-9708-019B960494DF}">
+                  <a14:hiddenLine xmlns:a14="http://schemas.microsoft.com/office/drawing/2010/main" w="9525">
                     <a:solidFill>
                       <a:srgbClr val="000000"/>
                     </a:solidFill>
@@ -10939,8 +11278,8 @@
                 <a:noFill/>
               </a:ln>
               <a:extLst>
-                <a:ext uri="{91240B29-F687-4f45-9708-019B960494DF}">
-                  <a14:hiddenLine xmlns:a14="http://schemas.microsoft.com/office/drawing/2010/main" xmlns="" w="9525">
+                <a:ext uri="{91240B29-F687-4F45-9708-019B960494DF}">
+                  <a14:hiddenLine xmlns:a14="http://schemas.microsoft.com/office/drawing/2010/main" w="9525">
                     <a:solidFill>
                       <a:srgbClr val="000000"/>
                     </a:solidFill>
@@ -10973,8 +11312,8 @@
                 <a:noFill/>
               </a:ln>
               <a:extLst>
-                <a:ext uri="{91240B29-F687-4f45-9708-019B960494DF}">
-                  <a14:hiddenLine xmlns:a14="http://schemas.microsoft.com/office/drawing/2010/main" xmlns="" w="9525">
+                <a:ext uri="{91240B29-F687-4F45-9708-019B960494DF}">
+                  <a14:hiddenLine xmlns:a14="http://schemas.microsoft.com/office/drawing/2010/main" w="9525">
                     <a:solidFill>
                       <a:srgbClr val="000000"/>
                     </a:solidFill>
@@ -11038,8 +11377,8 @@
                 <a:noFill/>
               </a:ln>
               <a:extLst>
-                <a:ext uri="{91240B29-F687-4f45-9708-019B960494DF}">
-                  <a14:hiddenLine xmlns:a14="http://schemas.microsoft.com/office/drawing/2010/main" xmlns="" w="9525">
+                <a:ext uri="{91240B29-F687-4F45-9708-019B960494DF}">
+                  <a14:hiddenLine xmlns:a14="http://schemas.microsoft.com/office/drawing/2010/main" w="9525">
                     <a:solidFill>
                       <a:srgbClr val="000000"/>
                     </a:solidFill>
@@ -11128,8 +11467,8 @@
                 <a:noFill/>
               </a:ln>
               <a:extLst>
-                <a:ext uri="{91240B29-F687-4f45-9708-019B960494DF}">
-                  <a14:hiddenLine xmlns:a14="http://schemas.microsoft.com/office/drawing/2010/main" xmlns="" w="9525">
+                <a:ext uri="{91240B29-F687-4F45-9708-019B960494DF}">
+                  <a14:hiddenLine xmlns:a14="http://schemas.microsoft.com/office/drawing/2010/main" w="9525">
                     <a:solidFill>
                       <a:srgbClr val="000000"/>
                     </a:solidFill>
@@ -11190,8 +11529,8 @@
                 <a:noFill/>
               </a:ln>
               <a:extLst>
-                <a:ext uri="{91240B29-F687-4f45-9708-019B960494DF}">
-                  <a14:hiddenLine xmlns:a14="http://schemas.microsoft.com/office/drawing/2010/main" xmlns="" w="9525">
+                <a:ext uri="{91240B29-F687-4F45-9708-019B960494DF}">
+                  <a14:hiddenLine xmlns:a14="http://schemas.microsoft.com/office/drawing/2010/main" w="9525">
                     <a:solidFill>
                       <a:srgbClr val="000000"/>
                     </a:solidFill>
@@ -11280,8 +11619,8 @@
                 <a:noFill/>
               </a:ln>
               <a:extLst>
-                <a:ext uri="{91240B29-F687-4f45-9708-019B960494DF}">
-                  <a14:hiddenLine xmlns:a14="http://schemas.microsoft.com/office/drawing/2010/main" xmlns="" w="9525">
+                <a:ext uri="{91240B29-F687-4F45-9708-019B960494DF}">
+                  <a14:hiddenLine xmlns:a14="http://schemas.microsoft.com/office/drawing/2010/main" w="9525">
                     <a:solidFill>
                       <a:srgbClr val="000000"/>
                     </a:solidFill>
@@ -11345,8 +11684,8 @@
                 <a:noFill/>
               </a:ln>
               <a:extLst>
-                <a:ext uri="{91240B29-F687-4f45-9708-019B960494DF}">
-                  <a14:hiddenLine xmlns:a14="http://schemas.microsoft.com/office/drawing/2010/main" xmlns="" w="9525">
+                <a:ext uri="{91240B29-F687-4F45-9708-019B960494DF}">
+                  <a14:hiddenLine xmlns:a14="http://schemas.microsoft.com/office/drawing/2010/main" w="9525">
                     <a:solidFill>
                       <a:srgbClr val="000000"/>
                     </a:solidFill>
@@ -11407,8 +11746,8 @@
                 <a:noFill/>
               </a:ln>
               <a:extLst>
-                <a:ext uri="{91240B29-F687-4f45-9708-019B960494DF}">
-                  <a14:hiddenLine xmlns:a14="http://schemas.microsoft.com/office/drawing/2010/main" xmlns="" w="9525">
+                <a:ext uri="{91240B29-F687-4F45-9708-019B960494DF}">
+                  <a14:hiddenLine xmlns:a14="http://schemas.microsoft.com/office/drawing/2010/main" w="9525">
                     <a:solidFill>
                       <a:srgbClr val="000000"/>
                     </a:solidFill>
@@ -11497,8 +11836,8 @@
                 <a:noFill/>
               </a:ln>
               <a:extLst>
-                <a:ext uri="{91240B29-F687-4f45-9708-019B960494DF}">
-                  <a14:hiddenLine xmlns:a14="http://schemas.microsoft.com/office/drawing/2010/main" xmlns="" w="9525">
+                <a:ext uri="{91240B29-F687-4F45-9708-019B960494DF}">
+                  <a14:hiddenLine xmlns:a14="http://schemas.microsoft.com/office/drawing/2010/main" w="9525">
                     <a:solidFill>
                       <a:srgbClr val="000000"/>
                     </a:solidFill>
@@ -11587,8 +11926,8 @@
                 <a:noFill/>
               </a:ln>
               <a:extLst>
-                <a:ext uri="{91240B29-F687-4f45-9708-019B960494DF}">
-                  <a14:hiddenLine xmlns:a14="http://schemas.microsoft.com/office/drawing/2010/main" xmlns="" w="9525">
+                <a:ext uri="{91240B29-F687-4F45-9708-019B960494DF}">
+                  <a14:hiddenLine xmlns:a14="http://schemas.microsoft.com/office/drawing/2010/main" w="9525">
                     <a:solidFill>
                       <a:srgbClr val="000000"/>
                     </a:solidFill>
@@ -11652,8 +11991,8 @@
                 <a:noFill/>
               </a:ln>
               <a:extLst>
-                <a:ext uri="{91240B29-F687-4f45-9708-019B960494DF}">
-                  <a14:hiddenLine xmlns:a14="http://schemas.microsoft.com/office/drawing/2010/main" xmlns="" w="9525">
+                <a:ext uri="{91240B29-F687-4F45-9708-019B960494DF}">
+                  <a14:hiddenLine xmlns:a14="http://schemas.microsoft.com/office/drawing/2010/main" w="9525">
                     <a:solidFill>
                       <a:srgbClr val="000000"/>
                     </a:solidFill>
@@ -11772,8 +12111,8 @@
                 <a:noFill/>
               </a:ln>
               <a:extLst>
-                <a:ext uri="{91240B29-F687-4f45-9708-019B960494DF}">
-                  <a14:hiddenLine xmlns:a14="http://schemas.microsoft.com/office/drawing/2010/main" xmlns="" w="9525">
+                <a:ext uri="{91240B29-F687-4F45-9708-019B960494DF}">
+                  <a14:hiddenLine xmlns:a14="http://schemas.microsoft.com/office/drawing/2010/main" w="9525">
                     <a:solidFill>
                       <a:srgbClr val="000000"/>
                     </a:solidFill>
@@ -11870,8 +12209,8 @@
                 <a:noFill/>
               </a:ln>
               <a:extLst>
-                <a:ext uri="{91240B29-F687-4f45-9708-019B960494DF}">
-                  <a14:hiddenLine xmlns:a14="http://schemas.microsoft.com/office/drawing/2010/main" xmlns="" w="9525">
+                <a:ext uri="{91240B29-F687-4F45-9708-019B960494DF}">
+                  <a14:hiddenLine xmlns:a14="http://schemas.microsoft.com/office/drawing/2010/main" w="9525">
                     <a:solidFill>
                       <a:srgbClr val="000000"/>
                     </a:solidFill>
@@ -11985,8 +12324,8 @@
                 <a:noFill/>
               </a:ln>
               <a:extLst>
-                <a:ext uri="{91240B29-F687-4f45-9708-019B960494DF}">
-                  <a14:hiddenLine xmlns:a14="http://schemas.microsoft.com/office/drawing/2010/main" xmlns="" w="9525">
+                <a:ext uri="{91240B29-F687-4F45-9708-019B960494DF}">
+                  <a14:hiddenLine xmlns:a14="http://schemas.microsoft.com/office/drawing/2010/main" w="9525">
                     <a:solidFill>
                       <a:srgbClr val="000000"/>
                     </a:solidFill>
@@ -12075,8 +12414,8 @@
                 <a:noFill/>
               </a:ln>
               <a:extLst>
-                <a:ext uri="{91240B29-F687-4f45-9708-019B960494DF}">
-                  <a14:hiddenLine xmlns:a14="http://schemas.microsoft.com/office/drawing/2010/main" xmlns="" w="9525">
+                <a:ext uri="{91240B29-F687-4F45-9708-019B960494DF}">
+                  <a14:hiddenLine xmlns:a14="http://schemas.microsoft.com/office/drawing/2010/main" w="9525">
                     <a:solidFill>
                       <a:srgbClr val="000000"/>
                     </a:solidFill>
@@ -12140,8 +12479,8 @@
                 <a:noFill/>
               </a:ln>
               <a:extLst>
-                <a:ext uri="{91240B29-F687-4f45-9708-019B960494DF}">
-                  <a14:hiddenLine xmlns:a14="http://schemas.microsoft.com/office/drawing/2010/main" xmlns="" w="9525">
+                <a:ext uri="{91240B29-F687-4F45-9708-019B960494DF}">
+                  <a14:hiddenLine xmlns:a14="http://schemas.microsoft.com/office/drawing/2010/main" w="9525">
                     <a:solidFill>
                       <a:srgbClr val="000000"/>
                     </a:solidFill>
@@ -12230,8 +12569,8 @@
                 <a:noFill/>
               </a:ln>
               <a:extLst>
-                <a:ext uri="{91240B29-F687-4f45-9708-019B960494DF}">
-                  <a14:hiddenLine xmlns:a14="http://schemas.microsoft.com/office/drawing/2010/main" xmlns="" w="9525">
+                <a:ext uri="{91240B29-F687-4F45-9708-019B960494DF}">
+                  <a14:hiddenLine xmlns:a14="http://schemas.microsoft.com/office/drawing/2010/main" w="9525">
                     <a:solidFill>
                       <a:srgbClr val="000000"/>
                     </a:solidFill>
@@ -12298,8 +12637,8 @@
                 <a:noFill/>
               </a:ln>
               <a:extLst>
-                <a:ext uri="{91240B29-F687-4f45-9708-019B960494DF}">
-                  <a14:hiddenLine xmlns:a14="http://schemas.microsoft.com/office/drawing/2010/main" xmlns="" w="9525">
+                <a:ext uri="{91240B29-F687-4F45-9708-019B960494DF}">
+                  <a14:hiddenLine xmlns:a14="http://schemas.microsoft.com/office/drawing/2010/main" w="9525">
                     <a:solidFill>
                       <a:srgbClr val="000000"/>
                     </a:solidFill>
@@ -12388,8 +12727,8 @@
                 <a:noFill/>
               </a:ln>
               <a:extLst>
-                <a:ext uri="{91240B29-F687-4f45-9708-019B960494DF}">
-                  <a14:hiddenLine xmlns:a14="http://schemas.microsoft.com/office/drawing/2010/main" xmlns="" w="9525">
+                <a:ext uri="{91240B29-F687-4F45-9708-019B960494DF}">
+                  <a14:hiddenLine xmlns:a14="http://schemas.microsoft.com/office/drawing/2010/main" w="9525">
                     <a:solidFill>
                       <a:srgbClr val="000000"/>
                     </a:solidFill>
@@ -12456,8 +12795,8 @@
                 <a:noFill/>
               </a:ln>
               <a:extLst>
-                <a:ext uri="{91240B29-F687-4f45-9708-019B960494DF}">
-                  <a14:hiddenLine xmlns:a14="http://schemas.microsoft.com/office/drawing/2010/main" xmlns="" w="9525">
+                <a:ext uri="{91240B29-F687-4F45-9708-019B960494DF}">
+                  <a14:hiddenLine xmlns:a14="http://schemas.microsoft.com/office/drawing/2010/main" w="9525">
                     <a:solidFill>
                       <a:srgbClr val="000000"/>
                     </a:solidFill>
@@ -12546,8 +12885,8 @@
                 <a:noFill/>
               </a:ln>
               <a:extLst>
-                <a:ext uri="{91240B29-F687-4f45-9708-019B960494DF}">
-                  <a14:hiddenLine xmlns:a14="http://schemas.microsoft.com/office/drawing/2010/main" xmlns="" w="9525">
+                <a:ext uri="{91240B29-F687-4F45-9708-019B960494DF}">
+                  <a14:hiddenLine xmlns:a14="http://schemas.microsoft.com/office/drawing/2010/main" w="9525">
                     <a:solidFill>
                       <a:srgbClr val="000000"/>
                     </a:solidFill>
@@ -12580,8 +12919,8 @@
                 <a:noFill/>
               </a:ln>
               <a:extLst>
-                <a:ext uri="{91240B29-F687-4f45-9708-019B960494DF}">
-                  <a14:hiddenLine xmlns:a14="http://schemas.microsoft.com/office/drawing/2010/main" xmlns="" w="9525">
+                <a:ext uri="{91240B29-F687-4F45-9708-019B960494DF}">
+                  <a14:hiddenLine xmlns:a14="http://schemas.microsoft.com/office/drawing/2010/main" w="9525">
                     <a:solidFill>
                       <a:srgbClr val="000000"/>
                     </a:solidFill>
@@ -13151,7 +13490,7 @@
           <p:cNvPr id="2" name="Title 1">
             <a:extLst>
               <a:ext uri="{FF2B5EF4-FFF2-40B4-BE49-F238E27FC236}">
-                <a16:creationId xmlns:a16="http://schemas.microsoft.com/office/drawing/2014/main" id="{0B3B79AA-E018-43B2-8178-674AC42BEE98}"/>
+                <a16:creationId xmlns:a16="http://schemas.microsoft.com/office/drawing/2014/main" xmlns="" id="{0B3B79AA-E018-43B2-8178-674AC42BEE98}"/>
               </a:ext>
             </a:extLst>
           </p:cNvPr>
@@ -13188,7 +13527,7 @@
           <p:cNvPr id="3" name="Subtitle 2">
             <a:extLst>
               <a:ext uri="{FF2B5EF4-FFF2-40B4-BE49-F238E27FC236}">
-                <a16:creationId xmlns:a16="http://schemas.microsoft.com/office/drawing/2014/main" id="{5561A825-F4EB-443E-99C6-F99940CB4178}"/>
+                <a16:creationId xmlns:a16="http://schemas.microsoft.com/office/drawing/2014/main" xmlns="" id="{5561A825-F4EB-443E-99C6-F99940CB4178}"/>
               </a:ext>
             </a:extLst>
           </p:cNvPr>
@@ -13266,7 +13605,7 @@
           <p:cNvPr id="2" name="Title 1">
             <a:extLst>
               <a:ext uri="{FF2B5EF4-FFF2-40B4-BE49-F238E27FC236}">
-                <a16:creationId xmlns:a16="http://schemas.microsoft.com/office/drawing/2014/main" id="{5CCE5219-BA2A-441E-8452-F80006D64435}"/>
+                <a16:creationId xmlns:a16="http://schemas.microsoft.com/office/drawing/2014/main" xmlns="" id="{5CCE5219-BA2A-441E-8452-F80006D64435}"/>
               </a:ext>
             </a:extLst>
           </p:cNvPr>
@@ -13294,7 +13633,7 @@
           <p:cNvPr id="4" name="TextBox 3">
             <a:extLst>
               <a:ext uri="{FF2B5EF4-FFF2-40B4-BE49-F238E27FC236}">
-                <a16:creationId xmlns:a16="http://schemas.microsoft.com/office/drawing/2014/main" id="{35FEDF86-0880-4749-A49F-7F0519121EA1}"/>
+                <a16:creationId xmlns:a16="http://schemas.microsoft.com/office/drawing/2014/main" xmlns="" id="{35FEDF86-0880-4749-A49F-7F0519121EA1}"/>
               </a:ext>
             </a:extLst>
           </p:cNvPr>
@@ -13329,7 +13668,7 @@
           <p:cNvPr id="5" name="TextBox 4">
             <a:extLst>
               <a:ext uri="{FF2B5EF4-FFF2-40B4-BE49-F238E27FC236}">
-                <a16:creationId xmlns:a16="http://schemas.microsoft.com/office/drawing/2014/main" id="{A3EA6AC5-0CE2-4683-A8B0-BE5E4C26EFF2}"/>
+                <a16:creationId xmlns:a16="http://schemas.microsoft.com/office/drawing/2014/main" xmlns="" id="{A3EA6AC5-0CE2-4683-A8B0-BE5E4C26EFF2}"/>
               </a:ext>
             </a:extLst>
           </p:cNvPr>
@@ -13402,7 +13741,7 @@
           <p:cNvPr id="6" name="TextBox 5">
             <a:extLst>
               <a:ext uri="{FF2B5EF4-FFF2-40B4-BE49-F238E27FC236}">
-                <a16:creationId xmlns:a16="http://schemas.microsoft.com/office/drawing/2014/main" id="{8F86A966-F811-4A4D-B19F-68A087362C7D}"/>
+                <a16:creationId xmlns:a16="http://schemas.microsoft.com/office/drawing/2014/main" xmlns="" id="{8F86A966-F811-4A4D-B19F-68A087362C7D}"/>
               </a:ext>
             </a:extLst>
           </p:cNvPr>
@@ -13437,7 +13776,7 @@
           <p:cNvPr id="7" name="TextBox 6">
             <a:extLst>
               <a:ext uri="{FF2B5EF4-FFF2-40B4-BE49-F238E27FC236}">
-                <a16:creationId xmlns:a16="http://schemas.microsoft.com/office/drawing/2014/main" id="{BF1449ED-421C-4F50-BEDE-C556AAD105AD}"/>
+                <a16:creationId xmlns:a16="http://schemas.microsoft.com/office/drawing/2014/main" xmlns="" id="{BF1449ED-421C-4F50-BEDE-C556AAD105AD}"/>
               </a:ext>
             </a:extLst>
           </p:cNvPr>
@@ -13526,7 +13865,7 @@
           <p:cNvPr id="2" name="Title 1">
             <a:extLst>
               <a:ext uri="{FF2B5EF4-FFF2-40B4-BE49-F238E27FC236}">
-                <a16:creationId xmlns:a16="http://schemas.microsoft.com/office/drawing/2014/main" id="{7537AEA4-F075-4576-B563-32CA4945037C}"/>
+                <a16:creationId xmlns:a16="http://schemas.microsoft.com/office/drawing/2014/main" xmlns="" id="{7537AEA4-F075-4576-B563-32CA4945037C}"/>
               </a:ext>
             </a:extLst>
           </p:cNvPr>
@@ -13554,7 +13893,7 @@
           <p:cNvPr id="3" name="Content Placeholder 2">
             <a:extLst>
               <a:ext uri="{FF2B5EF4-FFF2-40B4-BE49-F238E27FC236}">
-                <a16:creationId xmlns:a16="http://schemas.microsoft.com/office/drawing/2014/main" id="{660EAA33-8BA6-478C-AE1D-1B9F7A97A133}"/>
+                <a16:creationId xmlns:a16="http://schemas.microsoft.com/office/drawing/2014/main" xmlns="" id="{660EAA33-8BA6-478C-AE1D-1B9F7A97A133}"/>
               </a:ext>
             </a:extLst>
           </p:cNvPr>
@@ -13624,7 +13963,7 @@
           <p:cNvPr id="2" name="Title 1">
             <a:extLst>
               <a:ext uri="{FF2B5EF4-FFF2-40B4-BE49-F238E27FC236}">
-                <a16:creationId xmlns:a16="http://schemas.microsoft.com/office/drawing/2014/main" id="{80EE409B-B39A-4CBB-AB45-55470C958235}"/>
+                <a16:creationId xmlns:a16="http://schemas.microsoft.com/office/drawing/2014/main" xmlns="" id="{80EE409B-B39A-4CBB-AB45-55470C958235}"/>
               </a:ext>
             </a:extLst>
           </p:cNvPr>
@@ -13652,7 +13991,7 @@
           <p:cNvPr id="3" name="Content Placeholder 2">
             <a:extLst>
               <a:ext uri="{FF2B5EF4-FFF2-40B4-BE49-F238E27FC236}">
-                <a16:creationId xmlns:a16="http://schemas.microsoft.com/office/drawing/2014/main" id="{48F21673-AEFB-4B2A-874E-CCFEC9B17BE1}"/>
+                <a16:creationId xmlns:a16="http://schemas.microsoft.com/office/drawing/2014/main" xmlns="" id="{48F21673-AEFB-4B2A-874E-CCFEC9B17BE1}"/>
               </a:ext>
             </a:extLst>
           </p:cNvPr>
@@ -13740,7 +14079,7 @@
           <p:cNvPr id="2" name="Title 1">
             <a:extLst>
               <a:ext uri="{FF2B5EF4-FFF2-40B4-BE49-F238E27FC236}">
-                <a16:creationId xmlns:a16="http://schemas.microsoft.com/office/drawing/2014/main" id="{DDBFB066-6953-4D5A-AC2D-7E7D6CB34199}"/>
+                <a16:creationId xmlns:a16="http://schemas.microsoft.com/office/drawing/2014/main" xmlns="" id="{DDBFB066-6953-4D5A-AC2D-7E7D6CB34199}"/>
               </a:ext>
             </a:extLst>
           </p:cNvPr>
@@ -13768,7 +14107,7 @@
           <p:cNvPr id="3" name="Content Placeholder 2">
             <a:extLst>
               <a:ext uri="{FF2B5EF4-FFF2-40B4-BE49-F238E27FC236}">
-                <a16:creationId xmlns:a16="http://schemas.microsoft.com/office/drawing/2014/main" id="{D76C5965-3265-40D9-A7F9-4A989365565A}"/>
+                <a16:creationId xmlns:a16="http://schemas.microsoft.com/office/drawing/2014/main" xmlns="" id="{D76C5965-3265-40D9-A7F9-4A989365565A}"/>
               </a:ext>
             </a:extLst>
           </p:cNvPr>
@@ -13838,7 +14177,7 @@
           <p:cNvPr id="2" name="Title 1">
             <a:extLst>
               <a:ext uri="{FF2B5EF4-FFF2-40B4-BE49-F238E27FC236}">
-                <a16:creationId xmlns:a16="http://schemas.microsoft.com/office/drawing/2014/main" id="{79C571FD-DFB4-4F2E-8442-3A9C3AE15938}"/>
+                <a16:creationId xmlns:a16="http://schemas.microsoft.com/office/drawing/2014/main" xmlns="" id="{79C571FD-DFB4-4F2E-8442-3A9C3AE15938}"/>
               </a:ext>
             </a:extLst>
           </p:cNvPr>
@@ -13867,7 +14206,7 @@
           <p:cNvPr id="3" name="Content Placeholder 2">
             <a:extLst>
               <a:ext uri="{FF2B5EF4-FFF2-40B4-BE49-F238E27FC236}">
-                <a16:creationId xmlns:a16="http://schemas.microsoft.com/office/drawing/2014/main" id="{946CC509-B363-4853-B58E-B8A4B205BDE9}"/>
+                <a16:creationId xmlns:a16="http://schemas.microsoft.com/office/drawing/2014/main" xmlns="" id="{946CC509-B363-4853-B58E-B8A4B205BDE9}"/>
               </a:ext>
             </a:extLst>
           </p:cNvPr>
@@ -13946,7 +14285,7 @@
           <p:cNvPr id="2" name="Title 1">
             <a:extLst>
               <a:ext uri="{FF2B5EF4-FFF2-40B4-BE49-F238E27FC236}">
-                <a16:creationId xmlns:a16="http://schemas.microsoft.com/office/drawing/2014/main" id="{7C50C541-4189-4126-A522-DACC1E59B6B1}"/>
+                <a16:creationId xmlns:a16="http://schemas.microsoft.com/office/drawing/2014/main" xmlns="" id="{7C50C541-4189-4126-A522-DACC1E59B6B1}"/>
               </a:ext>
             </a:extLst>
           </p:cNvPr>
@@ -13974,7 +14313,7 @@
           <p:cNvPr id="3" name="Text Placeholder 2">
             <a:extLst>
               <a:ext uri="{FF2B5EF4-FFF2-40B4-BE49-F238E27FC236}">
-                <a16:creationId xmlns:a16="http://schemas.microsoft.com/office/drawing/2014/main" id="{78383CFF-948F-47A9-ADBF-2989635B28AE}"/>
+                <a16:creationId xmlns:a16="http://schemas.microsoft.com/office/drawing/2014/main" xmlns="" id="{78383CFF-948F-47A9-ADBF-2989635B28AE}"/>
               </a:ext>
             </a:extLst>
           </p:cNvPr>
@@ -14002,7 +14341,7 @@
           <p:cNvPr id="4" name="Content Placeholder 3">
             <a:extLst>
               <a:ext uri="{FF2B5EF4-FFF2-40B4-BE49-F238E27FC236}">
-                <a16:creationId xmlns:a16="http://schemas.microsoft.com/office/drawing/2014/main" id="{7850CBD6-9C4C-472E-8A11-F10611121523}"/>
+                <a16:creationId xmlns:a16="http://schemas.microsoft.com/office/drawing/2014/main" xmlns="" id="{7850CBD6-9C4C-472E-8A11-F10611121523}"/>
               </a:ext>
             </a:extLst>
           </p:cNvPr>
@@ -14048,7 +14387,7 @@
           <p:cNvPr id="5" name="Text Placeholder 4">
             <a:extLst>
               <a:ext uri="{FF2B5EF4-FFF2-40B4-BE49-F238E27FC236}">
-                <a16:creationId xmlns:a16="http://schemas.microsoft.com/office/drawing/2014/main" id="{D7561C5D-B53D-4A9D-8BD7-A7690EDBCA4F}"/>
+                <a16:creationId xmlns:a16="http://schemas.microsoft.com/office/drawing/2014/main" xmlns="" id="{D7561C5D-B53D-4A9D-8BD7-A7690EDBCA4F}"/>
               </a:ext>
             </a:extLst>
           </p:cNvPr>
@@ -14076,7 +14415,7 @@
           <p:cNvPr id="6" name="Content Placeholder 5">
             <a:extLst>
               <a:ext uri="{FF2B5EF4-FFF2-40B4-BE49-F238E27FC236}">
-                <a16:creationId xmlns:a16="http://schemas.microsoft.com/office/drawing/2014/main" id="{779AC2AA-C062-42F2-A7A9-5E6408607114}"/>
+                <a16:creationId xmlns:a16="http://schemas.microsoft.com/office/drawing/2014/main" xmlns="" id="{779AC2AA-C062-42F2-A7A9-5E6408607114}"/>
               </a:ext>
             </a:extLst>
           </p:cNvPr>
@@ -14157,7 +14496,7 @@
           <p:cNvPr id="2" name="Title 1">
             <a:extLst>
               <a:ext uri="{FF2B5EF4-FFF2-40B4-BE49-F238E27FC236}">
-                <a16:creationId xmlns:a16="http://schemas.microsoft.com/office/drawing/2014/main" id="{8249F8EF-1D0A-4F82-8B09-5C64B1D9E913}"/>
+                <a16:creationId xmlns:a16="http://schemas.microsoft.com/office/drawing/2014/main" xmlns="" id="{8249F8EF-1D0A-4F82-8B09-5C64B1D9E913}"/>
               </a:ext>
             </a:extLst>
           </p:cNvPr>
@@ -14193,7 +14532,7 @@
           <p:cNvPr id="3" name="Content Placeholder 2">
             <a:extLst>
               <a:ext uri="{FF2B5EF4-FFF2-40B4-BE49-F238E27FC236}">
-                <a16:creationId xmlns:a16="http://schemas.microsoft.com/office/drawing/2014/main" id="{ECFC4ABF-5B1A-477F-BA66-7C0E95A4CFE3}"/>
+                <a16:creationId xmlns:a16="http://schemas.microsoft.com/office/drawing/2014/main" xmlns="" id="{ECFC4ABF-5B1A-477F-BA66-7C0E95A4CFE3}"/>
               </a:ext>
             </a:extLst>
           </p:cNvPr>
@@ -14263,7 +14602,7 @@
           <p:cNvPr id="2" name="Title 1">
             <a:extLst>
               <a:ext uri="{FF2B5EF4-FFF2-40B4-BE49-F238E27FC236}">
-                <a16:creationId xmlns:a16="http://schemas.microsoft.com/office/drawing/2014/main" id="{D6F1348D-05FB-46C4-ACEC-360A0273D052}"/>
+                <a16:creationId xmlns:a16="http://schemas.microsoft.com/office/drawing/2014/main" xmlns="" id="{D6F1348D-05FB-46C4-ACEC-360A0273D052}"/>
               </a:ext>
             </a:extLst>
           </p:cNvPr>
@@ -14291,7 +14630,7 @@
           <p:cNvPr id="3" name="Content Placeholder 2">
             <a:extLst>
               <a:ext uri="{FF2B5EF4-FFF2-40B4-BE49-F238E27FC236}">
-                <a16:creationId xmlns:a16="http://schemas.microsoft.com/office/drawing/2014/main" id="{8B0C7E99-48BC-420C-BEFF-B5E376A3F59C}"/>
+                <a16:creationId xmlns:a16="http://schemas.microsoft.com/office/drawing/2014/main" xmlns="" id="{8B0C7E99-48BC-420C-BEFF-B5E376A3F59C}"/>
               </a:ext>
             </a:extLst>
           </p:cNvPr>
@@ -14599,7 +14938,15 @@
           <a:p>
             <a:r>
               <a:rPr lang="en-US" dirty="0"/>
-              <a:t>Can write database queries, inserts, updates, and deletes in languages like C# instead of SQL.</a:t>
+              <a:t>Can write database queries, inserts, updates, and deletes in </a:t>
+            </a:r>
+            <a:r>
+              <a:rPr lang="en-US" dirty="0" smtClean="0"/>
+              <a:t>object oriented languages instead </a:t>
+            </a:r>
+            <a:r>
+              <a:rPr lang="en-US" dirty="0"/>
+              <a:t>of SQL.</a:t>
             </a:r>
           </a:p>
           <a:p>
@@ -14611,11 +14958,7 @@
           <a:p>
             <a:r>
               <a:rPr lang="en-US" dirty="0"/>
-              <a:t>Allows us to utilize SQL </a:t>
-            </a:r>
-            <a:r>
-              <a:rPr lang="en-US"/>
-              <a:t>Server’s security tools.</a:t>
+              <a:t>Allows us to utilize SQL Server’s security tools.</a:t>
             </a:r>
           </a:p>
         </p:txBody>
@@ -14878,7 +15221,7 @@
   <a:extraClrSchemeLst/>
   <a:extLst>
     <a:ext uri="{05A4C25C-085E-4340-85A3-A5531E510DB2}">
-      <thm15:themeFamily xmlns:thm15="http://schemas.microsoft.com/office/thememl/2012/main" name="Circuit" id="{0AC2F7E7-15F5-431C-B2A2-456FE929F56C}" vid="{0911B802-464C-4241-8DD9-B60FF88E379F}"/>
+      <thm15:themeFamily xmlns:thm15="http://schemas.microsoft.com/office/thememl/2012/main" xmlns="" name="Circuit" id="{0AC2F7E7-15F5-431C-B2A2-456FE929F56C}" vid="{0911B802-464C-4241-8DD9-B60FF88E379F}"/>
     </a:ext>
   </a:extLst>
 </a:theme>
@@ -15173,7 +15516,7 @@
   <a:extraClrSchemeLst/>
   <a:extLst>
     <a:ext uri="{05A4C25C-085E-4340-85A3-A5531E510DB2}">
-      <thm15:themeFamily xmlns:thm15="http://schemas.microsoft.com/office/thememl/2012/main" name="Office Theme" id="{62F939B6-93AF-4DB8-9C6B-D6C7DFDC589F}" vid="{4A3C46E8-61CC-4603-A589-7422A47A8E4A}"/>
+      <thm15:themeFamily xmlns:thm15="http://schemas.microsoft.com/office/thememl/2012/main" xmlns="" name="Office Theme" id="{62F939B6-93AF-4DB8-9C6B-D6C7DFDC589F}" vid="{4A3C46E8-61CC-4603-A589-7422A47A8E4A}"/>
     </a:ext>
   </a:extLst>
 </a:theme>

</xml_diff>